<commit_message>
Power Point for next release
Finished adding in all changes to power point for 10/30 release.
</commit_message>
<xml_diff>
--- a/v2.3.0.pptx
+++ b/v2.3.0.pptx
@@ -14,9 +14,8 @@
     <p:sldId id="265" r:id="rId8"/>
     <p:sldId id="266" r:id="rId9"/>
     <p:sldId id="267" r:id="rId10"/>
-    <p:sldId id="259" r:id="rId11"/>
-    <p:sldId id="260" r:id="rId12"/>
-    <p:sldId id="261" r:id="rId13"/>
+    <p:sldId id="260" r:id="rId11"/>
+    <p:sldId id="261" r:id="rId12"/>
   </p:sldIdLst>
   <p:sldSz cx="12192000" cy="6858000"/>
   <p:notesSz cx="6858000" cy="9144000"/>
@@ -115,6 +114,11 @@
       </a:defRPr>
     </a:lvl9pPr>
   </p:defaultTextStyle>
+  <p:extLst>
+    <p:ext uri="{EFAFB233-063F-42B5-8137-9DF3F51BA10A}">
+      <p15:sldGuideLst xmlns:p15="http://schemas.microsoft.com/office/powerpoint/2012/main"/>
+    </p:ext>
+  </p:extLst>
 </p:presentation>
 </file>
 
@@ -844,7 +848,7 @@
           <a:p>
             <a:fld id="{CCED65F4-2A77-484B-94A0-5A930235145A}" type="datetimeFigureOut">
               <a:rPr lang="en-US" smtClean="0"/>
-              <a:t>20-Oct-17</a:t>
+              <a:t>10/23/2017</a:t>
             </a:fld>
             <a:endParaRPr lang="en-US"/>
           </a:p>
@@ -1095,7 +1099,7 @@
           <a:p>
             <a:fld id="{CCED65F4-2A77-484B-94A0-5A930235145A}" type="datetimeFigureOut">
               <a:rPr lang="en-US" smtClean="0"/>
-              <a:t>20-Oct-17</a:t>
+              <a:t>10/23/2017</a:t>
             </a:fld>
             <a:endParaRPr lang="en-US"/>
           </a:p>
@@ -1409,7 +1413,7 @@
           <a:p>
             <a:fld id="{CCED65F4-2A77-484B-94A0-5A930235145A}" type="datetimeFigureOut">
               <a:rPr lang="en-US" smtClean="0"/>
-              <a:t>20-Oct-17</a:t>
+              <a:t>10/23/2017</a:t>
             </a:fld>
             <a:endParaRPr lang="en-US"/>
           </a:p>
@@ -1750,7 +1754,7 @@
           <a:p>
             <a:fld id="{CCED65F4-2A77-484B-94A0-5A930235145A}" type="datetimeFigureOut">
               <a:rPr lang="en-US" smtClean="0"/>
-              <a:t>20-Oct-17</a:t>
+              <a:t>10/23/2017</a:t>
             </a:fld>
             <a:endParaRPr lang="en-US"/>
           </a:p>
@@ -2064,7 +2068,7 @@
           <a:p>
             <a:fld id="{CCED65F4-2A77-484B-94A0-5A930235145A}" type="datetimeFigureOut">
               <a:rPr lang="en-US" smtClean="0"/>
-              <a:t>20-Oct-17</a:t>
+              <a:t>10/23/2017</a:t>
             </a:fld>
             <a:endParaRPr lang="en-US"/>
           </a:p>
@@ -2457,7 +2461,7 @@
           <a:p>
             <a:fld id="{CCED65F4-2A77-484B-94A0-5A930235145A}" type="datetimeFigureOut">
               <a:rPr lang="en-US" smtClean="0"/>
-              <a:t>20-Oct-17</a:t>
+              <a:t>10/23/2017</a:t>
             </a:fld>
             <a:endParaRPr lang="en-US"/>
           </a:p>
@@ -2627,7 +2631,7 @@
           <a:p>
             <a:fld id="{CCED65F4-2A77-484B-94A0-5A930235145A}" type="datetimeFigureOut">
               <a:rPr lang="en-US" smtClean="0"/>
-              <a:t>20-Oct-17</a:t>
+              <a:t>10/23/2017</a:t>
             </a:fld>
             <a:endParaRPr lang="en-US"/>
           </a:p>
@@ -2807,7 +2811,7 @@
           <a:p>
             <a:fld id="{CCED65F4-2A77-484B-94A0-5A930235145A}" type="datetimeFigureOut">
               <a:rPr lang="en-US" smtClean="0"/>
-              <a:t>20-Oct-17</a:t>
+              <a:t>10/23/2017</a:t>
             </a:fld>
             <a:endParaRPr lang="en-US"/>
           </a:p>
@@ -2983,7 +2987,7 @@
           <a:p>
             <a:fld id="{CCED65F4-2A77-484B-94A0-5A930235145A}" type="datetimeFigureOut">
               <a:rPr lang="en-US" smtClean="0"/>
-              <a:t>20-Oct-17</a:t>
+              <a:t>10/23/2017</a:t>
             </a:fld>
             <a:endParaRPr lang="en-US"/>
           </a:p>
@@ -3230,7 +3234,7 @@
           <a:p>
             <a:fld id="{CCED65F4-2A77-484B-94A0-5A930235145A}" type="datetimeFigureOut">
               <a:rPr lang="en-US" smtClean="0"/>
-              <a:t>20-Oct-17</a:t>
+              <a:t>10/23/2017</a:t>
             </a:fld>
             <a:endParaRPr lang="en-US"/>
           </a:p>
@@ -3462,7 +3466,7 @@
           <a:p>
             <a:fld id="{CCED65F4-2A77-484B-94A0-5A930235145A}" type="datetimeFigureOut">
               <a:rPr lang="en-US" smtClean="0"/>
-              <a:t>20-Oct-17</a:t>
+              <a:t>10/23/2017</a:t>
             </a:fld>
             <a:endParaRPr lang="en-US"/>
           </a:p>
@@ -3836,7 +3840,7 @@
           <a:p>
             <a:fld id="{CCED65F4-2A77-484B-94A0-5A930235145A}" type="datetimeFigureOut">
               <a:rPr lang="en-US" smtClean="0"/>
-              <a:t>20-Oct-17</a:t>
+              <a:t>10/23/2017</a:t>
             </a:fld>
             <a:endParaRPr lang="en-US"/>
           </a:p>
@@ -3959,7 +3963,7 @@
           <a:p>
             <a:fld id="{CCED65F4-2A77-484B-94A0-5A930235145A}" type="datetimeFigureOut">
               <a:rPr lang="en-US" smtClean="0"/>
-              <a:t>20-Oct-17</a:t>
+              <a:t>10/23/2017</a:t>
             </a:fld>
             <a:endParaRPr lang="en-US"/>
           </a:p>
@@ -4054,7 +4058,7 @@
           <a:p>
             <a:fld id="{CCED65F4-2A77-484B-94A0-5A930235145A}" type="datetimeFigureOut">
               <a:rPr lang="en-US" smtClean="0"/>
-              <a:t>20-Oct-17</a:t>
+              <a:t>10/23/2017</a:t>
             </a:fld>
             <a:endParaRPr lang="en-US"/>
           </a:p>
@@ -4309,7 +4313,7 @@
           <a:p>
             <a:fld id="{CCED65F4-2A77-484B-94A0-5A930235145A}" type="datetimeFigureOut">
               <a:rPr lang="en-US" smtClean="0"/>
-              <a:t>20-Oct-17</a:t>
+              <a:t>10/23/2017</a:t>
             </a:fld>
             <a:endParaRPr lang="en-US"/>
           </a:p>
@@ -4572,7 +4576,7 @@
           <a:p>
             <a:fld id="{CCED65F4-2A77-484B-94A0-5A930235145A}" type="datetimeFigureOut">
               <a:rPr lang="en-US" smtClean="0"/>
-              <a:t>20-Oct-17</a:t>
+              <a:t>10/23/2017</a:t>
             </a:fld>
             <a:endParaRPr lang="en-US"/>
           </a:p>
@@ -5315,7 +5319,7 @@
           <a:p>
             <a:fld id="{CCED65F4-2A77-484B-94A0-5A930235145A}" type="datetimeFigureOut">
               <a:rPr lang="en-US" smtClean="0"/>
-              <a:t>20-Oct-17</a:t>
+              <a:t>10/23/2017</a:t>
             </a:fld>
             <a:endParaRPr lang="en-US"/>
           </a:p>
@@ -5930,7 +5934,7 @@
           <p:cNvPr id="2" name="Title 1">
             <a:extLst>
               <a:ext uri="{FF2B5EF4-FFF2-40B4-BE49-F238E27FC236}">
-                <a16:creationId xmlns:a16="http://schemas.microsoft.com/office/drawing/2014/main" id="{13492FA0-00F0-4006-A0C5-9DCD2F08BA16}"/>
+                <a16:creationId xmlns:a16="http://schemas.microsoft.com/office/drawing/2014/main" id="{4A2B3F76-5462-4FFC-9D39-3A97E0EB5F30}"/>
               </a:ext>
             </a:extLst>
           </p:cNvPr>
@@ -5946,7 +5950,10 @@
           <a:bodyPr/>
           <a:lstStyle/>
           <a:p>
-            <a:endParaRPr lang="en-US" dirty="0"/>
+            <a:r>
+              <a:rPr lang="en-US" dirty="0"/>
+              <a:t>Bug Fixes</a:t>
+            </a:r>
           </a:p>
         </p:txBody>
       </p:sp>
@@ -5955,7 +5962,7 @@
           <p:cNvPr id="3" name="Content Placeholder 2">
             <a:extLst>
               <a:ext uri="{FF2B5EF4-FFF2-40B4-BE49-F238E27FC236}">
-                <a16:creationId xmlns:a16="http://schemas.microsoft.com/office/drawing/2014/main" id="{B6B0C46F-DC4A-4E39-911A-8C2BA5430BDE}"/>
+                <a16:creationId xmlns:a16="http://schemas.microsoft.com/office/drawing/2014/main" id="{F59C36D5-56C8-43A4-BC05-5169F427EE8B}"/>
               </a:ext>
             </a:extLst>
           </p:cNvPr>
@@ -5971,14 +5978,37 @@
           <a:bodyPr/>
           <a:lstStyle/>
           <a:p>
-            <a:endParaRPr lang="en-US"/>
+            <a:r>
+              <a:rPr lang="en-US" dirty="0"/>
+              <a:t>Return process is now showing the current date instead of the original sale date.</a:t>
+            </a:r>
+          </a:p>
+          <a:p>
+            <a:r>
+              <a:rPr lang="en-US" dirty="0"/>
+              <a:t>When completing a return the amount to refund to customer was being calculated as an integer (whole number rounding down). It has now been corrected to calculate as a double (allows decimals).</a:t>
+            </a:r>
+          </a:p>
+          <a:p>
+            <a:r>
+              <a:rPr lang="en-US" dirty="0"/>
+              <a:t>Cancel button on the </a:t>
+            </a:r>
+            <a:r>
+              <a:rPr lang="en-US" dirty="0" err="1"/>
+              <a:t>TradeIn</a:t>
+            </a:r>
+            <a:r>
+              <a:rPr lang="en-US" dirty="0"/>
+              <a:t> page no longer requires any validation, so it now actually works.</a:t>
+            </a:r>
           </a:p>
         </p:txBody>
       </p:sp>
     </p:spTree>
     <p:extLst>
       <p:ext uri="{BB962C8B-B14F-4D97-AF65-F5344CB8AC3E}">
-        <p14:creationId xmlns:p14="http://schemas.microsoft.com/office/powerpoint/2010/main" val="2488819716"/>
+        <p14:creationId xmlns:p14="http://schemas.microsoft.com/office/powerpoint/2010/main" val="1321752644"/>
       </p:ext>
     </p:extLst>
   </p:cSld>
@@ -6010,86 +6040,6 @@
           <p:cNvPr id="2" name="Title 1">
             <a:extLst>
               <a:ext uri="{FF2B5EF4-FFF2-40B4-BE49-F238E27FC236}">
-                <a16:creationId xmlns:a16="http://schemas.microsoft.com/office/drawing/2014/main" id="{4A2B3F76-5462-4FFC-9D39-3A97E0EB5F30}"/>
-              </a:ext>
-            </a:extLst>
-          </p:cNvPr>
-          <p:cNvSpPr>
-            <a:spLocks noGrp="1"/>
-          </p:cNvSpPr>
-          <p:nvPr>
-            <p:ph type="title"/>
-          </p:nvPr>
-        </p:nvSpPr>
-        <p:spPr/>
-        <p:txBody>
-          <a:bodyPr/>
-          <a:lstStyle/>
-          <a:p>
-            <a:endParaRPr lang="en-US"/>
-          </a:p>
-        </p:txBody>
-      </p:sp>
-      <p:sp>
-        <p:nvSpPr>
-          <p:cNvPr id="3" name="Content Placeholder 2">
-            <a:extLst>
-              <a:ext uri="{FF2B5EF4-FFF2-40B4-BE49-F238E27FC236}">
-                <a16:creationId xmlns:a16="http://schemas.microsoft.com/office/drawing/2014/main" id="{F59C36D5-56C8-43A4-BC05-5169F427EE8B}"/>
-              </a:ext>
-            </a:extLst>
-          </p:cNvPr>
-          <p:cNvSpPr>
-            <a:spLocks noGrp="1"/>
-          </p:cNvSpPr>
-          <p:nvPr>
-            <p:ph idx="1"/>
-          </p:nvPr>
-        </p:nvSpPr>
-        <p:spPr/>
-        <p:txBody>
-          <a:bodyPr/>
-          <a:lstStyle/>
-          <a:p>
-            <a:endParaRPr lang="en-US"/>
-          </a:p>
-        </p:txBody>
-      </p:sp>
-    </p:spTree>
-    <p:extLst>
-      <p:ext uri="{BB962C8B-B14F-4D97-AF65-F5344CB8AC3E}">
-        <p14:creationId xmlns:p14="http://schemas.microsoft.com/office/powerpoint/2010/main" val="1321752644"/>
-      </p:ext>
-    </p:extLst>
-  </p:cSld>
-  <p:clrMapOvr>
-    <a:masterClrMapping/>
-  </p:clrMapOvr>
-</p:sld>
-</file>
-
-<file path=ppt/slides/slide12.xml><?xml version="1.0" encoding="utf-8"?>
-<p:sld xmlns:a="http://schemas.openxmlformats.org/drawingml/2006/main" xmlns:r="http://schemas.openxmlformats.org/officeDocument/2006/relationships" xmlns:p="http://schemas.openxmlformats.org/presentationml/2006/main">
-  <p:cSld>
-    <p:spTree>
-      <p:nvGrpSpPr>
-        <p:cNvPr id="1" name=""/>
-        <p:cNvGrpSpPr/>
-        <p:nvPr/>
-      </p:nvGrpSpPr>
-      <p:grpSpPr>
-        <a:xfrm>
-          <a:off x="0" y="0"/>
-          <a:ext cx="0" cy="0"/>
-          <a:chOff x="0" y="0"/>
-          <a:chExt cx="0" cy="0"/>
-        </a:xfrm>
-      </p:grpSpPr>
-      <p:sp>
-        <p:nvSpPr>
-          <p:cNvPr id="2" name="Title 1">
-            <a:extLst>
-              <a:ext uri="{FF2B5EF4-FFF2-40B4-BE49-F238E27FC236}">
                 <a16:creationId xmlns:a16="http://schemas.microsoft.com/office/drawing/2014/main" id="{1812947E-C1BA-40E1-940E-2563BDE697B2}"/>
               </a:ext>
             </a:extLst>
@@ -6148,11 +6098,14 @@
           <a:p>
             <a:r>
               <a:rPr lang="en-US" dirty="0"/>
-              <a:t>Pressing enter on the sales page searches for invoices.</a:t>
-            </a:r>
-          </a:p>
-          <a:p>
-            <a:endParaRPr lang="en-US" dirty="0"/>
+              <a:t>Sales Home Page default button has now been changed to the invoice search (pressing enter on keyboard).</a:t>
+            </a:r>
+          </a:p>
+          <a:p>
+            <a:r>
+              <a:rPr lang="en-US" dirty="0"/>
+              <a:t>The Change Calculator on the Checkout screen when making a sale using cash has now been given a title to more readily identify it’s function (enter the cash tendered to calculate the change due).</a:t>
+            </a:r>
           </a:p>
         </p:txBody>
       </p:sp>
@@ -6301,7 +6254,7 @@
           <a:p>
             <a:r>
               <a:rPr lang="en-US" dirty="0"/>
-              <a:t>Changing Customer Mid Sale</a:t>
+              <a:t>Changing Customer During a Sale</a:t>
             </a:r>
           </a:p>
         </p:txBody>
@@ -6322,20 +6275,31 @@
             <p:ph idx="1"/>
           </p:nvPr>
         </p:nvSpPr>
-        <p:spPr/>
+        <p:spPr>
+          <a:xfrm>
+            <a:off x="677334" y="2160589"/>
+            <a:ext cx="6293092" cy="3880773"/>
+          </a:xfrm>
+        </p:spPr>
         <p:txBody>
           <a:bodyPr/>
           <a:lstStyle/>
           <a:p>
             <a:r>
               <a:rPr lang="en-US" dirty="0"/>
-              <a:t>If you want to change or add a customer mid sale, the functionality of doing so has now been added. </a:t>
+              <a:t>During a sale a user is now able to change the customer.</a:t>
             </a:r>
           </a:p>
           <a:p>
             <a:r>
               <a:rPr lang="en-US" dirty="0"/>
-              <a:t>Notice at the top of the sale there is a textbox showing the current customer’s name and a button that reads </a:t>
+              <a:t>Enter the customer you are searching for in the Customer Name field.</a:t>
+            </a:r>
+          </a:p>
+          <a:p>
+            <a:r>
+              <a:rPr lang="en-US" dirty="0"/>
+              <a:t>Click on the </a:t>
             </a:r>
             <a:r>
               <a:rPr lang="en-US" i="1" dirty="0"/>
@@ -6343,7 +6307,7 @@
             </a:r>
             <a:r>
               <a:rPr lang="en-US" dirty="0"/>
-              <a:t>.</a:t>
+              <a:t> button.</a:t>
             </a:r>
           </a:p>
           <a:p>
@@ -6353,8 +6317,23 @@
           <a:p>
             <a:r>
               <a:rPr lang="en-US" dirty="0"/>
-              <a:t>To change the customer, type the first and/or last name, or phone number of the customer you are looking for and press the button.</a:t>
-            </a:r>
+              <a:t>A list of all matching customers will be displayed.</a:t>
+            </a:r>
+          </a:p>
+          <a:p>
+            <a:r>
+              <a:rPr lang="en-US" dirty="0"/>
+              <a:t>Click on Switch Customer beside the customer you want to use.</a:t>
+            </a:r>
+          </a:p>
+          <a:p>
+            <a:r>
+              <a:rPr lang="en-US" dirty="0"/>
+              <a:t>Or click cancel to keep the current customer on the sale.</a:t>
+            </a:r>
+          </a:p>
+          <a:p>
+            <a:endParaRPr lang="en-US" dirty="0"/>
           </a:p>
           <a:p>
             <a:endParaRPr lang="en-US" dirty="0"/>
@@ -6383,8 +6362,38 @@
         </p:blipFill>
         <p:spPr>
           <a:xfrm>
-            <a:off x="2827780" y="3445486"/>
+            <a:off x="1868409" y="3953337"/>
             <a:ext cx="4295775" cy="295275"/>
+          </a:xfrm>
+          <a:prstGeom prst="rect">
+            <a:avLst/>
+          </a:prstGeom>
+        </p:spPr>
+      </p:pic>
+      <p:pic>
+        <p:nvPicPr>
+          <p:cNvPr id="5" name="Picture 4">
+            <a:extLst>
+              <a:ext uri="{FF2B5EF4-FFF2-40B4-BE49-F238E27FC236}">
+                <a16:creationId xmlns:a16="http://schemas.microsoft.com/office/drawing/2014/main" id="{00B43372-219A-4A34-8B84-74F3956476C8}"/>
+              </a:ext>
+            </a:extLst>
+          </p:cNvPr>
+          <p:cNvPicPr>
+            <a:picLocks noChangeAspect="1"/>
+          </p:cNvPicPr>
+          <p:nvPr/>
+        </p:nvPicPr>
+        <p:blipFill>
+          <a:blip r:embed="rId3"/>
+          <a:stretch>
+            <a:fillRect/>
+          </a:stretch>
+        </p:blipFill>
+        <p:spPr>
+          <a:xfrm>
+            <a:off x="6970426" y="3030446"/>
+            <a:ext cx="4086225" cy="1390650"/>
           </a:xfrm>
           <a:prstGeom prst="rect">
             <a:avLst/>
@@ -6444,7 +6453,7 @@
           <a:p>
             <a:r>
               <a:rPr lang="en-US" dirty="0"/>
-              <a:t>Changing Customer Mid Sale cont.</a:t>
+              <a:t>Adding a Customer During a Sale</a:t>
             </a:r>
           </a:p>
         </p:txBody>
@@ -6465,81 +6474,72 @@
             <p:ph idx="1"/>
           </p:nvPr>
         </p:nvSpPr>
-        <p:spPr/>
+        <p:spPr>
+          <a:xfrm>
+            <a:off x="677334" y="1394085"/>
+            <a:ext cx="10580279" cy="3399503"/>
+          </a:xfrm>
+        </p:spPr>
         <p:txBody>
           <a:bodyPr>
-            <a:normAutofit fontScale="92500" lnSpcReduction="10000"/>
+            <a:normAutofit/>
           </a:bodyPr>
           <a:lstStyle/>
           <a:p>
             <a:r>
               <a:rPr lang="en-US" dirty="0"/>
-              <a:t>If the customer is found, it will return </a:t>
-            </a:r>
-          </a:p>
-          <a:p>
-            <a:pPr marL="0" indent="0">
-              <a:buNone/>
-            </a:pPr>
+              <a:t>During a sale a user is now able to add a new customer to the database and have the current sale attributed to the new customer.</a:t>
+            </a:r>
+          </a:p>
+          <a:p>
             <a:r>
               <a:rPr lang="en-US" dirty="0"/>
-              <a:t>	them in a list. </a:t>
-            </a:r>
-          </a:p>
-          <a:p>
-            <a:pPr marL="0" indent="0">
-              <a:buNone/>
-            </a:pPr>
+              <a:t>At any time during a sale click on the </a:t>
+            </a:r>
+            <a:r>
+              <a:rPr lang="en-US" i="1" dirty="0"/>
+              <a:t>Select Different Customer </a:t>
+            </a:r>
+            <a:r>
+              <a:rPr lang="en-US" dirty="0"/>
+              <a:t>button.</a:t>
+            </a:r>
+          </a:p>
+          <a:p>
+            <a:r>
+              <a:rPr lang="en-US" dirty="0"/>
+              <a:t>At the bottom of the customer search will be text boxes to enter a first name and last name of the customer.</a:t>
+            </a:r>
+          </a:p>
+          <a:p>
+            <a:r>
+              <a:rPr lang="en-US" dirty="0"/>
+              <a:t>The First and Last name fields are required the Phone Number field is not.</a:t>
+            </a:r>
+          </a:p>
+          <a:p>
+            <a:r>
+              <a:rPr lang="en-US" dirty="0"/>
+              <a:t>Click on the Add Customer button and the new customer will be added to the database. </a:t>
+            </a:r>
+          </a:p>
+          <a:p>
+            <a:r>
+              <a:rPr lang="en-US" dirty="0"/>
+              <a:t>Please always make sure that you have searched for the customer first before adding them to the database as this will prevent duplicate customers being created.</a:t>
+            </a:r>
+          </a:p>
+          <a:p>
             <a:endParaRPr lang="en-US" dirty="0"/>
-          </a:p>
-          <a:p>
-            <a:r>
-              <a:rPr lang="en-US" dirty="0"/>
-              <a:t>To switch the customer, click the blue text.</a:t>
-            </a:r>
-          </a:p>
-          <a:p>
-            <a:pPr lvl="1"/>
-            <a:r>
-              <a:rPr lang="en-US" dirty="0"/>
-              <a:t>When you switch a customer mid sale, all inventory already in the cart will remain in the cart.</a:t>
-            </a:r>
-          </a:p>
-          <a:p>
-            <a:r>
-              <a:rPr lang="en-US" dirty="0"/>
-              <a:t>Adding a customer is as easy as entering a first and last name in the boxes at the bottom of the list. The phone number is optional.</a:t>
-            </a:r>
-          </a:p>
-          <a:p>
-            <a:pPr lvl="1"/>
-            <a:r>
-              <a:rPr lang="en-US" dirty="0"/>
-              <a:t>This will show up at the bottom of every search.</a:t>
-            </a:r>
-          </a:p>
-          <a:p>
-            <a:pPr lvl="1"/>
-            <a:r>
-              <a:rPr lang="en-US" dirty="0"/>
-              <a:t>If you want to add a customer, an easy way to do that is leave the customer name box empty and pressing the button next to it for a blank sale. </a:t>
-            </a:r>
-          </a:p>
-          <a:p>
-            <a:pPr lvl="1"/>
-            <a:r>
-              <a:rPr lang="en-US" dirty="0"/>
-              <a:t>The newly added customer will become the customer of the current sale.</a:t>
-            </a:r>
           </a:p>
         </p:txBody>
       </p:sp>
       <p:pic>
         <p:nvPicPr>
-          <p:cNvPr id="7" name="Picture 6">
+          <p:cNvPr id="3" name="Picture 2">
             <a:extLst>
               <a:ext uri="{FF2B5EF4-FFF2-40B4-BE49-F238E27FC236}">
-                <a16:creationId xmlns:a16="http://schemas.microsoft.com/office/drawing/2014/main" id="{34572EA7-E94C-4445-A6DF-C615AC753BBD}"/>
+                <a16:creationId xmlns:a16="http://schemas.microsoft.com/office/drawing/2014/main" id="{E11F2105-18A9-4185-A7D1-6F3DF1D279D5}"/>
               </a:ext>
             </a:extLst>
           </p:cNvPr>
@@ -6556,8 +6556,8 @@
         </p:blipFill>
         <p:spPr>
           <a:xfrm>
-            <a:off x="5187777" y="1930400"/>
-            <a:ext cx="4086225" cy="1390650"/>
+            <a:off x="2918268" y="4793587"/>
+            <a:ext cx="4114800" cy="1247775"/>
           </a:xfrm>
           <a:prstGeom prst="rect">
             <a:avLst/>
@@ -6772,7 +6772,12 @@
             <p:ph idx="1"/>
           </p:nvPr>
         </p:nvSpPr>
-        <p:spPr/>
+        <p:spPr>
+          <a:xfrm>
+            <a:off x="677334" y="1424067"/>
+            <a:ext cx="8596668" cy="4617296"/>
+          </a:xfrm>
+        </p:spPr>
         <p:txBody>
           <a:bodyPr/>
           <a:lstStyle/>
@@ -6789,16 +6794,40 @@
             </a:r>
           </a:p>
           <a:p>
-            <a:endParaRPr lang="en-US" dirty="0"/>
+            <a:r>
+              <a:rPr lang="en-US" dirty="0"/>
+              <a:t>Please Note:</a:t>
+            </a:r>
+          </a:p>
+          <a:p>
+            <a:pPr lvl="1"/>
+            <a:r>
+              <a:rPr lang="en-US" dirty="0"/>
+              <a:t>All employees will now need to be setup with a passcode.</a:t>
+            </a:r>
+          </a:p>
+          <a:p>
+            <a:pPr lvl="1"/>
+            <a:r>
+              <a:rPr lang="en-US" dirty="0"/>
+              <a:t>Sales can also only be completed with a passcode from an employee that is listed as Sales Staff.</a:t>
+            </a:r>
+          </a:p>
+          <a:p>
+            <a:pPr lvl="1"/>
+            <a:r>
+              <a:rPr lang="en-US" dirty="0"/>
+              <a:t>No Admin passcodes will process sales.</a:t>
+            </a:r>
           </a:p>
         </p:txBody>
       </p:sp>
       <p:pic>
         <p:nvPicPr>
-          <p:cNvPr id="4" name="Picture 3">
+          <p:cNvPr id="5" name="Picture 4">
             <a:extLst>
               <a:ext uri="{FF2B5EF4-FFF2-40B4-BE49-F238E27FC236}">
-                <a16:creationId xmlns:a16="http://schemas.microsoft.com/office/drawing/2014/main" id="{40142AFB-92C6-4645-ACA2-070CB80D0175}"/>
+                <a16:creationId xmlns:a16="http://schemas.microsoft.com/office/drawing/2014/main" id="{46187053-C5A2-49F9-BE34-BAD139D014DF}"/>
               </a:ext>
             </a:extLst>
           </p:cNvPr>
@@ -6815,8 +6844,8 @@
         </p:blipFill>
         <p:spPr>
           <a:xfrm>
-            <a:off x="1703830" y="3502342"/>
-            <a:ext cx="6543675" cy="2200275"/>
+            <a:off x="2999230" y="4859312"/>
+            <a:ext cx="3952875" cy="1066800"/>
           </a:xfrm>
           <a:prstGeom prst="rect">
             <a:avLst/>

</xml_diff>